<commit_message>
fix pooled variance typo in 06 slides
</commit_message>
<xml_diff>
--- a/lectures/25f-eas420_lec06_hyp-tests.pptx
+++ b/lectures/25f-eas420_lec06_hyp-tests.pptx
@@ -307,7 +307,7 @@
           <a:p>
             <a:fld id="{EB9021FD-58CC-2F4C-B253-ECFF5457A26A}" type="datetimeFigureOut">
               <a:rPr lang="en-US" smtClean="0"/>
-              <a:t>11/5/25</a:t>
+              <a:t>11/20/25</a:t>
             </a:fld>
             <a:endParaRPr lang="en-US"/>
           </a:p>
@@ -3997,7 +3997,7 @@
           <a:p>
             <a:fld id="{17CA49E4-EF0F-DD4F-9523-E1E9E1AA5371}" type="datetimeFigureOut">
               <a:rPr lang="en-US" smtClean="0"/>
-              <a:t>11/5/25</a:t>
+              <a:t>11/20/25</a:t>
             </a:fld>
             <a:endParaRPr lang="en-US"/>
           </a:p>
@@ -4195,7 +4195,7 @@
           <a:p>
             <a:fld id="{17CA49E4-EF0F-DD4F-9523-E1E9E1AA5371}" type="datetimeFigureOut">
               <a:rPr lang="en-US" smtClean="0"/>
-              <a:t>11/5/25</a:t>
+              <a:t>11/20/25</a:t>
             </a:fld>
             <a:endParaRPr lang="en-US"/>
           </a:p>
@@ -4403,7 +4403,7 @@
           <a:p>
             <a:fld id="{17CA49E4-EF0F-DD4F-9523-E1E9E1AA5371}" type="datetimeFigureOut">
               <a:rPr lang="en-US" smtClean="0"/>
-              <a:t>11/5/25</a:t>
+              <a:t>11/20/25</a:t>
             </a:fld>
             <a:endParaRPr lang="en-US"/>
           </a:p>
@@ -4647,7 +4647,7 @@
           <a:p>
             <a:fld id="{17CA49E4-EF0F-DD4F-9523-E1E9E1AA5371}" type="datetimeFigureOut">
               <a:rPr lang="en-US" smtClean="0"/>
-              <a:t>11/5/25</a:t>
+              <a:t>11/20/25</a:t>
             </a:fld>
             <a:endParaRPr lang="en-US"/>
           </a:p>
@@ -4922,7 +4922,7 @@
           <a:p>
             <a:fld id="{17CA49E4-EF0F-DD4F-9523-E1E9E1AA5371}" type="datetimeFigureOut">
               <a:rPr lang="en-US" smtClean="0"/>
-              <a:t>11/5/25</a:t>
+              <a:t>11/20/25</a:t>
             </a:fld>
             <a:endParaRPr lang="en-US"/>
           </a:p>
@@ -5187,7 +5187,7 @@
           <a:p>
             <a:fld id="{17CA49E4-EF0F-DD4F-9523-E1E9E1AA5371}" type="datetimeFigureOut">
               <a:rPr lang="en-US" smtClean="0"/>
-              <a:t>11/5/25</a:t>
+              <a:t>11/20/25</a:t>
             </a:fld>
             <a:endParaRPr lang="en-US"/>
           </a:p>
@@ -5599,7 +5599,7 @@
           <a:p>
             <a:fld id="{17CA49E4-EF0F-DD4F-9523-E1E9E1AA5371}" type="datetimeFigureOut">
               <a:rPr lang="en-US" smtClean="0"/>
-              <a:t>11/5/25</a:t>
+              <a:t>11/20/25</a:t>
             </a:fld>
             <a:endParaRPr lang="en-US"/>
           </a:p>
@@ -5740,7 +5740,7 @@
           <a:p>
             <a:fld id="{17CA49E4-EF0F-DD4F-9523-E1E9E1AA5371}" type="datetimeFigureOut">
               <a:rPr lang="en-US" smtClean="0"/>
-              <a:t>11/5/25</a:t>
+              <a:t>11/20/25</a:t>
             </a:fld>
             <a:endParaRPr lang="en-US"/>
           </a:p>
@@ -5853,7 +5853,7 @@
           <a:p>
             <a:fld id="{17CA49E4-EF0F-DD4F-9523-E1E9E1AA5371}" type="datetimeFigureOut">
               <a:rPr lang="en-US" smtClean="0"/>
-              <a:t>11/5/25</a:t>
+              <a:t>11/20/25</a:t>
             </a:fld>
             <a:endParaRPr lang="en-US"/>
           </a:p>
@@ -6164,7 +6164,7 @@
           <a:p>
             <a:fld id="{17CA49E4-EF0F-DD4F-9523-E1E9E1AA5371}" type="datetimeFigureOut">
               <a:rPr lang="en-US" smtClean="0"/>
-              <a:t>11/5/25</a:t>
+              <a:t>11/20/25</a:t>
             </a:fld>
             <a:endParaRPr lang="en-US"/>
           </a:p>
@@ -6452,7 +6452,7 @@
           <a:p>
             <a:fld id="{17CA49E4-EF0F-DD4F-9523-E1E9E1AA5371}" type="datetimeFigureOut">
               <a:rPr lang="en-US" smtClean="0"/>
-              <a:t>11/5/25</a:t>
+              <a:t>11/20/25</a:t>
             </a:fld>
             <a:endParaRPr lang="en-US"/>
           </a:p>
@@ -6693,7 +6693,7 @@
           <a:p>
             <a:fld id="{17CA49E4-EF0F-DD4F-9523-E1E9E1AA5371}" type="datetimeFigureOut">
               <a:rPr lang="en-US" smtClean="0"/>
-              <a:t>11/5/25</a:t>
+              <a:t>11/20/25</a:t>
             </a:fld>
             <a:endParaRPr lang="en-US"/>
           </a:p>
@@ -8974,8 +8974,8 @@
           <a:chExt cx="0" cy="0"/>
         </a:xfrm>
       </p:grpSpPr>
-      <mc:AlternateContent xmlns:mc="http://schemas.openxmlformats.org/markup-compatibility/2006" xmlns:a14="http://schemas.microsoft.com/office/drawing/2010/main">
-        <mc:Choice Requires="a14">
+      <mc:AlternateContent xmlns:mc="http://schemas.openxmlformats.org/markup-compatibility/2006">
+        <mc:Choice xmlns:a14="http://schemas.microsoft.com/office/drawing/2010/main" Requires="a14">
           <p:sp>
             <p:nvSpPr>
               <p:cNvPr id="3" name="Content Placeholder 2">
@@ -9049,27 +9049,27 @@
                 </a:r>
                 <a14:m>
                   <m:oMath xmlns:m="http://schemas.openxmlformats.org/officeDocument/2006/math">
-                    <m:sSub>
-                      <m:sSubPr>
+                    <m:sSubSup>
+                      <m:sSubSupPr>
                         <m:ctrlPr>
                           <a:rPr lang="en-US" i="1" smtClean="0">
                             <a:latin typeface="Cambria Math" panose="02040503050406030204" pitchFamily="18" charset="0"/>
                           </a:rPr>
                         </m:ctrlPr>
-                      </m:sSubPr>
+                      </m:sSubSupPr>
                       <m:e>
                         <m:acc>
                           <m:accPr>
                             <m:chr m:val="̂"/>
                             <m:ctrlPr>
-                              <a:rPr lang="en-US" i="1" smtClean="0">
+                              <a:rPr lang="en-US" i="1">
                                 <a:latin typeface="Cambria Math" panose="02040503050406030204" pitchFamily="18" charset="0"/>
                               </a:rPr>
                             </m:ctrlPr>
                           </m:accPr>
                           <m:e>
                             <m:r>
-                              <a:rPr lang="en-US" i="1" smtClean="0">
+                              <a:rPr lang="en-US" i="1">
                                 <a:latin typeface="Cambria Math" panose="02040503050406030204" pitchFamily="18" charset="0"/>
                               </a:rPr>
                               <m:t>𝜎</m:t>
@@ -9085,7 +9085,15 @@
                           <m:t>𝑝</m:t>
                         </m:r>
                       </m:sub>
-                    </m:sSub>
+                      <m:sup>
+                        <m:r>
+                          <a:rPr lang="en-US" i="1">
+                            <a:latin typeface="Cambria Math" panose="02040503050406030204" pitchFamily="18" charset="0"/>
+                          </a:rPr>
+                          <m:t>2</m:t>
+                        </m:r>
+                      </m:sup>
+                    </m:sSubSup>
                   </m:oMath>
                 </a14:m>
                 <a:r>
@@ -9098,7 +9106,53 @@
                 </a:r>
                 <a:r>
                   <a:rPr lang="en-US" dirty="0"/>
-                  <a:t>, </a:t>
+                  <a:t>, and </a:t>
+                </a:r>
+                <a14:m>
+                  <m:oMath xmlns:m="http://schemas.openxmlformats.org/officeDocument/2006/math">
+                    <m:sSubSup>
+                      <m:sSubSupPr>
+                        <m:ctrlPr>
+                          <a:rPr lang="en-US" i="1">
+                            <a:latin typeface="Cambria Math" panose="02040503050406030204" pitchFamily="18" charset="0"/>
+                          </a:rPr>
+                        </m:ctrlPr>
+                      </m:sSubSupPr>
+                      <m:e>
+                        <m:acc>
+                          <m:accPr>
+                            <m:chr m:val="̂"/>
+                            <m:ctrlPr>
+                              <a:rPr lang="en-US" i="1">
+                                <a:latin typeface="Cambria Math" panose="02040503050406030204" pitchFamily="18" charset="0"/>
+                              </a:rPr>
+                            </m:ctrlPr>
+                          </m:accPr>
+                          <m:e>
+                            <m:r>
+                              <a:rPr lang="en-US" i="1">
+                                <a:latin typeface="Cambria Math" panose="02040503050406030204" pitchFamily="18" charset="0"/>
+                              </a:rPr>
+                              <m:t>𝜎</m:t>
+                            </m:r>
+                          </m:e>
+                        </m:acc>
+                      </m:e>
+                      <m:sub>
+                        <m:r>
+                          <a:rPr lang="en-US" i="1">
+                            <a:latin typeface="Cambria Math" panose="02040503050406030204" pitchFamily="18" charset="0"/>
+                          </a:rPr>
+                          <m:t>𝑝</m:t>
+                        </m:r>
+                      </m:sub>
+                      <m:sup/>
+                    </m:sSubSup>
+                  </m:oMath>
+                </a14:m>
+                <a:r>
+                  <a:rPr lang="en-US" dirty="0"/>
+                  <a:t> is the square root</a:t>
                 </a:r>
               </a:p>
               <a:p>
@@ -9133,7 +9187,7 @@
             </p:txBody>
           </p:sp>
         </mc:Choice>
-        <mc:Fallback xmlns="">
+        <mc:Fallback>
           <p:sp>
             <p:nvSpPr>
               <p:cNvPr id="3" name="Content Placeholder 2">
@@ -9158,7 +9212,7 @@
               <a:blipFill>
                 <a:blip r:embed="rId3"/>
                 <a:stretch>
-                  <a:fillRect l="-1327"/>
+                  <a:fillRect l="-1327" b="-680"/>
                 </a:stretch>
               </a:blipFill>
             </p:spPr>

</xml_diff>